<commit_message>
Interview en product presentatie geupdate
</commit_message>
<xml_diff>
--- a/Presentatie.pptx
+++ b/Presentatie.pptx
@@ -211,7 +211,7 @@
           <a:p>
             <a:fld id="{45244D74-A434-456E-A2D6-A174A873DB27}" type="datetimeFigureOut">
               <a:rPr lang="nl-NL" smtClean="0"/>
-              <a:t>13-4-2015</a:t>
+              <a:t>15-4-2015</a:t>
             </a:fld>
             <a:endParaRPr lang="nl-NL"/>
           </a:p>
@@ -376,7 +376,7 @@
           <a:p>
             <a:fld id="{1BB41A74-A6BE-48D8-8B73-ECA36C8A7BFE}" type="datetimeFigureOut">
               <a:rPr lang="nl-NL" smtClean="0"/>
-              <a:t>13-4-2015</a:t>
+              <a:t>15-4-2015</a:t>
             </a:fld>
             <a:endParaRPr lang="nl-NL"/>
           </a:p>
@@ -715,7 +715,7 @@
           <a:p>
             <a:fld id="{7B0FC7B4-AB3D-4EA8-A9DB-2B61DC5F89CC}" type="datetime1">
               <a:rPr lang="nl-NL" smtClean="0"/>
-              <a:t>13-4-2015</a:t>
+              <a:t>15-4-2015</a:t>
             </a:fld>
             <a:endParaRPr lang="nl-NL" dirty="0"/>
           </a:p>
@@ -903,7 +903,7 @@
           <a:p>
             <a:fld id="{D3508A91-0AA4-4448-BAC6-5C0A4820891B}" type="datetime1">
               <a:rPr lang="nl-NL" smtClean="0"/>
-              <a:t>13-4-2015</a:t>
+              <a:t>15-4-2015</a:t>
             </a:fld>
             <a:endParaRPr lang="nl-NL"/>
           </a:p>
@@ -1294,7 +1294,7 @@
           <a:p>
             <a:fld id="{5782F50F-33B8-4739-B56D-053B6761C188}" type="datetime1">
               <a:rPr lang="nl-NL" smtClean="0"/>
-              <a:t>13-4-2015</a:t>
+              <a:t>15-4-2015</a:t>
             </a:fld>
             <a:endParaRPr lang="nl-NL" dirty="0"/>
           </a:p>
@@ -1818,7 +1818,7 @@
           <a:p>
             <a:fld id="{64DF3249-2596-41DD-AC27-B4E42227A895}" type="datetime1">
               <a:rPr lang="nl-NL" smtClean="0"/>
-              <a:t>13-4-2015</a:t>
+              <a:t>15-4-2015</a:t>
             </a:fld>
             <a:endParaRPr lang="nl-NL"/>
           </a:p>
@@ -2119,7 +2119,7 @@
           <a:p>
             <a:fld id="{C640B414-68E8-4BED-A816-61CF1D27D6F6}" type="datetime1">
               <a:rPr lang="nl-NL" smtClean="0"/>
-              <a:t>13-4-2015</a:t>
+              <a:t>15-4-2015</a:t>
             </a:fld>
             <a:endParaRPr lang="nl-NL"/>
           </a:p>
@@ -2419,7 +2419,7 @@
           <a:p>
             <a:fld id="{691C0250-0366-4ABB-9F54-0DECA15F9EB9}" type="datetime1">
               <a:rPr lang="nl-NL" smtClean="0"/>
-              <a:t>13-4-2015</a:t>
+              <a:t>15-4-2015</a:t>
             </a:fld>
             <a:endParaRPr lang="nl-NL"/>
           </a:p>
@@ -2933,7 +2933,7 @@
           <a:p>
             <a:fld id="{68CA71AE-DB5A-413C-9957-D767A30A8493}" type="datetime1">
               <a:rPr lang="nl-NL" smtClean="0"/>
-              <a:t>13-4-2015</a:t>
+              <a:t>15-4-2015</a:t>
             </a:fld>
             <a:endParaRPr lang="nl-NL"/>
           </a:p>
@@ -3123,7 +3123,7 @@
           <a:p>
             <a:fld id="{496F1E48-53BC-496C-9ECF-2639EA117A35}" type="datetime1">
               <a:rPr lang="nl-NL" smtClean="0"/>
-              <a:t>13-4-2015</a:t>
+              <a:t>15-4-2015</a:t>
             </a:fld>
             <a:endParaRPr lang="nl-NL"/>
           </a:p>
@@ -3313,7 +3313,7 @@
           <a:p>
             <a:fld id="{F0E39382-3410-4225-B7AE-D0C064EB9D80}" type="datetime1">
               <a:rPr lang="nl-NL" smtClean="0"/>
-              <a:t>13-4-2015</a:t>
+              <a:t>15-4-2015</a:t>
             </a:fld>
             <a:endParaRPr lang="nl-NL"/>
           </a:p>
@@ -3641,7 +3641,7 @@
           <a:p>
             <a:fld id="{E420C392-18A3-4D3A-8F13-5345CFE84C58}" type="datetime1">
               <a:rPr lang="nl-NL" smtClean="0"/>
-              <a:t>13-4-2015</a:t>
+              <a:t>15-4-2015</a:t>
             </a:fld>
             <a:endParaRPr lang="nl-NL"/>
           </a:p>
@@ -3885,7 +3885,7 @@
           <a:p>
             <a:fld id="{34FA34CE-40B4-4262-94ED-B5C177459006}" type="datetime1">
               <a:rPr lang="nl-NL" smtClean="0"/>
-              <a:t>13-4-2015</a:t>
+              <a:t>15-4-2015</a:t>
             </a:fld>
             <a:endParaRPr lang="nl-NL"/>
           </a:p>
@@ -4205,7 +4205,7 @@
           <a:p>
             <a:fld id="{6389DC7C-93CF-4008-82B6-142B047EFEF4}" type="datetime1">
               <a:rPr lang="nl-NL" smtClean="0"/>
-              <a:t>13-4-2015</a:t>
+              <a:t>15-4-2015</a:t>
             </a:fld>
             <a:endParaRPr lang="nl-NL" dirty="0"/>
           </a:p>
@@ -4829,7 +4829,7 @@
           <a:p>
             <a:fld id="{64DF3249-2596-41DD-AC27-B4E42227A895}" type="datetime1">
               <a:rPr lang="nl-NL" smtClean="0"/>
-              <a:t>13-4-2015</a:t>
+              <a:t>15-4-2015</a:t>
             </a:fld>
             <a:endParaRPr lang="nl-NL"/>
           </a:p>
@@ -4979,7 +4979,7 @@
                   <a:schemeClr val="tx1"/>
                 </a:solidFill>
               </a:rPr>
-              <a:t>Realible</a:t>
+              <a:t>Reliable</a:t>
             </a:r>
             <a:endParaRPr lang="nl-NL" sz="2800" dirty="0">
               <a:solidFill>
@@ -4998,7 +4998,23 @@
                   <a:schemeClr val="tx1"/>
                 </a:solidFill>
               </a:rPr>
-              <a:t>Unbreakable</a:t>
+              <a:t>Self</a:t>
+            </a:r>
+            <a:r>
+              <a:rPr lang="nl-NL" sz="2800" dirty="0" smtClean="0">
+                <a:solidFill>
+                  <a:schemeClr val="tx1"/>
+                </a:solidFill>
+              </a:rPr>
+              <a:t> </a:t>
+            </a:r>
+            <a:r>
+              <a:rPr lang="nl-NL" sz="2800" dirty="0" err="1" smtClean="0">
+                <a:solidFill>
+                  <a:schemeClr val="tx1"/>
+                </a:solidFill>
+              </a:rPr>
+              <a:t>programmable</a:t>
             </a:r>
             <a:endParaRPr lang="nl-NL" sz="2800" dirty="0" smtClean="0">
               <a:solidFill>
@@ -5017,7 +5033,7 @@
                   <a:schemeClr val="tx1"/>
                 </a:solidFill>
               </a:rPr>
-              <a:t>Self</a:t>
+              <a:t>You</a:t>
             </a:r>
             <a:r>
               <a:rPr lang="nl-NL" sz="2800" dirty="0" smtClean="0">
@@ -5033,7 +5049,55 @@
                   <a:schemeClr val="tx1"/>
                 </a:solidFill>
               </a:rPr>
-              <a:t>programmable</a:t>
+              <a:t>can</a:t>
+            </a:r>
+            <a:r>
+              <a:rPr lang="nl-NL" sz="2800" dirty="0" smtClean="0">
+                <a:solidFill>
+                  <a:schemeClr val="tx1"/>
+                </a:solidFill>
+              </a:rPr>
+              <a:t> </a:t>
+            </a:r>
+            <a:r>
+              <a:rPr lang="nl-NL" sz="2800" dirty="0" err="1" smtClean="0">
+                <a:solidFill>
+                  <a:schemeClr val="tx1"/>
+                </a:solidFill>
+              </a:rPr>
+              <a:t>tell</a:t>
+            </a:r>
+            <a:r>
+              <a:rPr lang="nl-NL" sz="2800" dirty="0" smtClean="0">
+                <a:solidFill>
+                  <a:schemeClr val="tx1"/>
+                </a:solidFill>
+              </a:rPr>
+              <a:t> time </a:t>
+            </a:r>
+            <a:r>
+              <a:rPr lang="nl-NL" sz="2800" dirty="0" err="1" smtClean="0">
+                <a:solidFill>
+                  <a:schemeClr val="tx1"/>
+                </a:solidFill>
+              </a:rPr>
+              <a:t>with</a:t>
+            </a:r>
+            <a:r>
+              <a:rPr lang="nl-NL" sz="2800" dirty="0" smtClean="0">
+                <a:solidFill>
+                  <a:schemeClr val="tx1"/>
+                </a:solidFill>
+              </a:rPr>
+              <a:t> </a:t>
+            </a:r>
+            <a:r>
+              <a:rPr lang="nl-NL" sz="2800" dirty="0" err="1" smtClean="0">
+                <a:solidFill>
+                  <a:schemeClr val="tx1"/>
+                </a:solidFill>
+              </a:rPr>
+              <a:t>it</a:t>
             </a:r>
             <a:endParaRPr lang="nl-NL" sz="2800" dirty="0" smtClean="0">
               <a:solidFill>
@@ -5041,89 +5105,6 @@
               </a:solidFill>
             </a:endParaRPr>
           </a:p>
-          <a:p>
-            <a:pPr marL="285750" indent="-285750">
-              <a:buFont typeface="Arial" panose="020B0604020202020204" pitchFamily="34" charset="0"/>
-              <a:buChar char="•"/>
-            </a:pPr>
-            <a:r>
-              <a:rPr lang="nl-NL" sz="2800" dirty="0" err="1" smtClean="0">
-                <a:solidFill>
-                  <a:schemeClr val="tx1"/>
-                </a:solidFill>
-              </a:rPr>
-              <a:t>You</a:t>
-            </a:r>
-            <a:r>
-              <a:rPr lang="nl-NL" sz="2800" dirty="0" smtClean="0">
-                <a:solidFill>
-                  <a:schemeClr val="tx1"/>
-                </a:solidFill>
-              </a:rPr>
-              <a:t> </a:t>
-            </a:r>
-            <a:r>
-              <a:rPr lang="nl-NL" sz="2800" dirty="0" err="1" smtClean="0">
-                <a:solidFill>
-                  <a:schemeClr val="tx1"/>
-                </a:solidFill>
-              </a:rPr>
-              <a:t>can</a:t>
-            </a:r>
-            <a:r>
-              <a:rPr lang="nl-NL" sz="2800" dirty="0" smtClean="0">
-                <a:solidFill>
-                  <a:schemeClr val="tx1"/>
-                </a:solidFill>
-              </a:rPr>
-              <a:t> </a:t>
-            </a:r>
-            <a:r>
-              <a:rPr lang="nl-NL" sz="2800" dirty="0" err="1" smtClean="0">
-                <a:solidFill>
-                  <a:schemeClr val="tx1"/>
-                </a:solidFill>
-              </a:rPr>
-              <a:t>tell</a:t>
-            </a:r>
-            <a:r>
-              <a:rPr lang="nl-NL" sz="2800" dirty="0" smtClean="0">
-                <a:solidFill>
-                  <a:schemeClr val="tx1"/>
-                </a:solidFill>
-              </a:rPr>
-              <a:t> time </a:t>
-            </a:r>
-            <a:r>
-              <a:rPr lang="nl-NL" sz="2800" dirty="0" err="1" smtClean="0">
-                <a:solidFill>
-                  <a:schemeClr val="tx1"/>
-                </a:solidFill>
-              </a:rPr>
-              <a:t>with</a:t>
-            </a:r>
-            <a:r>
-              <a:rPr lang="nl-NL" sz="2800" dirty="0" smtClean="0">
-                <a:solidFill>
-                  <a:schemeClr val="tx1"/>
-                </a:solidFill>
-              </a:rPr>
-              <a:t> </a:t>
-            </a:r>
-            <a:r>
-              <a:rPr lang="nl-NL" sz="2800" dirty="0" err="1" smtClean="0">
-                <a:solidFill>
-                  <a:schemeClr val="tx1"/>
-                </a:solidFill>
-              </a:rPr>
-              <a:t>it</a:t>
-            </a:r>
-            <a:endParaRPr lang="nl-NL" sz="2800" dirty="0" smtClean="0">
-              <a:solidFill>
-                <a:schemeClr val="tx1"/>
-              </a:solidFill>
-            </a:endParaRPr>
-          </a:p>
         </p:txBody>
       </p:sp>
       <p:sp>
@@ -5143,7 +5124,7 @@
           <a:p>
             <a:fld id="{34FA34CE-40B4-4262-94ED-B5C177459006}" type="datetime1">
               <a:rPr lang="nl-NL" smtClean="0"/>
-              <a:t>13-4-2015</a:t>
+              <a:t>15-4-2015</a:t>
             </a:fld>
             <a:endParaRPr lang="nl-NL"/>
           </a:p>
@@ -5662,7 +5643,7 @@
           <a:p>
             <a:fld id="{34FA34CE-40B4-4262-94ED-B5C177459006}" type="datetime1">
               <a:rPr lang="nl-NL" smtClean="0"/>
-              <a:t>13-4-2015</a:t>
+              <a:t>15-4-2015</a:t>
             </a:fld>
             <a:endParaRPr lang="nl-NL"/>
           </a:p>
@@ -5828,7 +5809,7 @@
           <a:p>
             <a:fld id="{34FA34CE-40B4-4262-94ED-B5C177459006}" type="datetime1">
               <a:rPr lang="nl-NL" smtClean="0"/>
-              <a:t>13-4-2015</a:t>
+              <a:t>15-4-2015</a:t>
             </a:fld>
             <a:endParaRPr lang="nl-NL"/>
           </a:p>
@@ -6196,7 +6177,7 @@
           <a:p>
             <a:fld id="{34FA34CE-40B4-4262-94ED-B5C177459006}" type="datetime1">
               <a:rPr lang="nl-NL" smtClean="0"/>
-              <a:t>13-4-2015</a:t>
+              <a:t>15-4-2015</a:t>
             </a:fld>
             <a:endParaRPr lang="nl-NL"/>
           </a:p>
@@ -6378,7 +6359,7 @@
           <a:p>
             <a:fld id="{34FA34CE-40B4-4262-94ED-B5C177459006}" type="datetime1">
               <a:rPr lang="nl-NL" smtClean="0"/>
-              <a:t>13-4-2015</a:t>
+              <a:t>15-4-2015</a:t>
             </a:fld>
             <a:endParaRPr lang="nl-NL"/>
           </a:p>
@@ -6432,7 +6413,7 @@
       </p:sp>
       <p:sp>
         <p:nvSpPr>
-          <p:cNvPr id="7" name="Titel 6"/>
+          <p:cNvPr id="10" name="Titel 6"/>
           <p:cNvSpPr>
             <a:spLocks noGrp="1"/>
           </p:cNvSpPr>
@@ -6442,7 +6423,7 @@
         </p:nvSpPr>
         <p:spPr>
           <a:xfrm>
-            <a:off x="838200" y="2803525"/>
+            <a:off x="838200" y="365125"/>
             <a:ext cx="10515600" cy="828675"/>
           </a:xfrm>
         </p:spPr>
@@ -6450,12 +6431,373 @@
           <a:bodyPr/>
           <a:lstStyle/>
           <a:p>
-            <a:pPr algn="ctr"/>
-            <a:r>
-              <a:rPr lang="nl-NL" i="1" u="sng" dirty="0" err="1" smtClean="0"/>
-              <a:t>Demonstration</a:t>
-            </a:r>
-            <a:endParaRPr lang="nl-NL" i="1" u="sng" dirty="0"/>
+            <a:r>
+              <a:rPr lang="nl-NL" dirty="0" err="1" smtClean="0"/>
+              <a:t>Functionality</a:t>
+            </a:r>
+            <a:endParaRPr lang="nl-NL" dirty="0"/>
+          </a:p>
+        </p:txBody>
+      </p:sp>
+      <p:sp>
+        <p:nvSpPr>
+          <p:cNvPr id="11" name="Tijdelijke aanduiding voor inhoud 7"/>
+          <p:cNvSpPr>
+            <a:spLocks noGrp="1"/>
+          </p:cNvSpPr>
+          <p:nvPr>
+            <p:ph sz="quarter" idx="13"/>
+          </p:nvPr>
+        </p:nvSpPr>
+        <p:spPr>
+          <a:xfrm>
+            <a:off x="838200" y="1146968"/>
+            <a:ext cx="8407400" cy="452438"/>
+          </a:xfrm>
+        </p:spPr>
+        <p:txBody>
+          <a:bodyPr>
+            <a:normAutofit lnSpcReduction="10000"/>
+          </a:bodyPr>
+          <a:lstStyle/>
+          <a:p>
+            <a:r>
+              <a:rPr lang="nl-NL" dirty="0" smtClean="0"/>
+              <a:t>How </a:t>
+            </a:r>
+            <a:r>
+              <a:rPr lang="nl-NL" dirty="0" err="1" smtClean="0"/>
+              <a:t>to</a:t>
+            </a:r>
+            <a:r>
+              <a:rPr lang="nl-NL" dirty="0" smtClean="0"/>
+              <a:t> control the STK-Alarm </a:t>
+            </a:r>
+            <a:r>
+              <a:rPr lang="nl-NL" dirty="0" err="1" smtClean="0"/>
+              <a:t>clock</a:t>
+            </a:r>
+            <a:endParaRPr lang="nl-NL" dirty="0"/>
+          </a:p>
+        </p:txBody>
+      </p:sp>
+      <p:sp>
+        <p:nvSpPr>
+          <p:cNvPr id="3" name="Tekstvak 2"/>
+          <p:cNvSpPr txBox="1"/>
+          <p:nvPr/>
+        </p:nvSpPr>
+        <p:spPr>
+          <a:xfrm>
+            <a:off x="838200" y="1599406"/>
+            <a:ext cx="8728364" cy="4462760"/>
+          </a:xfrm>
+          <a:prstGeom prst="rect">
+            <a:avLst/>
+          </a:prstGeom>
+          <a:noFill/>
+        </p:spPr>
+        <p:txBody>
+          <a:bodyPr wrap="square" rtlCol="0">
+            <a:spAutoFit/>
+          </a:bodyPr>
+          <a:lstStyle/>
+          <a:p>
+            <a:pPr marL="285750" indent="-285750">
+              <a:buFont typeface="Arial" panose="020B0604020202020204" pitchFamily="34" charset="0"/>
+              <a:buChar char="•"/>
+            </a:pPr>
+            <a:r>
+              <a:rPr lang="nl-NL" sz="2800" dirty="0" smtClean="0"/>
+              <a:t>Setting the time</a:t>
+            </a:r>
+          </a:p>
+          <a:p>
+            <a:pPr marL="742950" lvl="1" indent="-285750">
+              <a:buFont typeface="Arial" panose="020B0604020202020204" pitchFamily="34" charset="0"/>
+              <a:buChar char="•"/>
+            </a:pPr>
+            <a:r>
+              <a:rPr lang="nl-NL" dirty="0" smtClean="0"/>
+              <a:t>Start the alarm </a:t>
+            </a:r>
+            <a:r>
+              <a:rPr lang="nl-NL" dirty="0" err="1" smtClean="0"/>
+              <a:t>clock</a:t>
+            </a:r>
+            <a:endParaRPr lang="nl-NL" dirty="0" smtClean="0"/>
+          </a:p>
+          <a:p>
+            <a:pPr marL="742950" lvl="1" indent="-285750">
+              <a:buFont typeface="Arial" panose="020B0604020202020204" pitchFamily="34" charset="0"/>
+              <a:buChar char="•"/>
+            </a:pPr>
+            <a:r>
+              <a:rPr lang="nl-NL" dirty="0" smtClean="0"/>
+              <a:t>Press the SW0 button </a:t>
+            </a:r>
+            <a:r>
+              <a:rPr lang="nl-NL" dirty="0" err="1" smtClean="0"/>
+              <a:t>to</a:t>
+            </a:r>
+            <a:r>
+              <a:rPr lang="nl-NL" dirty="0" smtClean="0"/>
+              <a:t> increment </a:t>
+            </a:r>
+            <a:r>
+              <a:rPr lang="nl-NL" dirty="0" err="1" smtClean="0"/>
+              <a:t>hours</a:t>
+            </a:r>
+            <a:r>
+              <a:rPr lang="nl-NL" dirty="0" smtClean="0"/>
+              <a:t>/minutes/</a:t>
+            </a:r>
+            <a:r>
+              <a:rPr lang="nl-NL" dirty="0" err="1" smtClean="0"/>
+              <a:t>seconds</a:t>
+            </a:r>
+            <a:endParaRPr lang="nl-NL" dirty="0" smtClean="0"/>
+          </a:p>
+          <a:p>
+            <a:pPr marL="742950" lvl="1" indent="-285750">
+              <a:buFont typeface="Arial" panose="020B0604020202020204" pitchFamily="34" charset="0"/>
+              <a:buChar char="•"/>
+            </a:pPr>
+            <a:r>
+              <a:rPr lang="nl-NL" dirty="0" smtClean="0"/>
+              <a:t>Press the SW1 button </a:t>
+            </a:r>
+            <a:r>
+              <a:rPr lang="nl-NL" dirty="0" err="1" smtClean="0"/>
+              <a:t>to</a:t>
+            </a:r>
+            <a:r>
+              <a:rPr lang="nl-NL" dirty="0" smtClean="0"/>
+              <a:t> switch </a:t>
+            </a:r>
+            <a:r>
+              <a:rPr lang="nl-NL" dirty="0" err="1" smtClean="0"/>
+              <a:t>between</a:t>
+            </a:r>
+            <a:r>
+              <a:rPr lang="nl-NL" dirty="0" smtClean="0"/>
+              <a:t> </a:t>
+            </a:r>
+            <a:r>
+              <a:rPr lang="nl-NL" dirty="0" err="1" smtClean="0"/>
+              <a:t>hours</a:t>
+            </a:r>
+            <a:r>
+              <a:rPr lang="nl-NL" dirty="0" smtClean="0"/>
+              <a:t>/minutes/</a:t>
+            </a:r>
+            <a:r>
+              <a:rPr lang="nl-NL" dirty="0" err="1" smtClean="0"/>
+              <a:t>seconds</a:t>
+            </a:r>
+            <a:endParaRPr lang="nl-NL" dirty="0" smtClean="0"/>
+          </a:p>
+          <a:p>
+            <a:pPr marL="742950" lvl="1" indent="-285750">
+              <a:buFont typeface="Arial" panose="020B0604020202020204" pitchFamily="34" charset="0"/>
+              <a:buChar char="•"/>
+            </a:pPr>
+            <a:endParaRPr lang="nl-NL" dirty="0" smtClean="0"/>
+          </a:p>
+          <a:p>
+            <a:pPr marL="285750" indent="-285750">
+              <a:buFont typeface="Arial" panose="020B0604020202020204" pitchFamily="34" charset="0"/>
+              <a:buChar char="•"/>
+            </a:pPr>
+            <a:r>
+              <a:rPr lang="nl-NL" sz="2800" dirty="0" smtClean="0"/>
+              <a:t>Setting the alarm</a:t>
+            </a:r>
+          </a:p>
+          <a:p>
+            <a:pPr marL="742950" lvl="1" indent="-285750">
+              <a:buFont typeface="Arial" panose="020B0604020202020204" pitchFamily="34" charset="0"/>
+              <a:buChar char="•"/>
+            </a:pPr>
+            <a:r>
+              <a:rPr lang="nl-NL" dirty="0" smtClean="0"/>
+              <a:t>Same way as setting time but </a:t>
+            </a:r>
+            <a:r>
+              <a:rPr lang="nl-NL" dirty="0" err="1" smtClean="0"/>
+              <a:t>only</a:t>
+            </a:r>
+            <a:r>
+              <a:rPr lang="nl-NL" dirty="0" smtClean="0"/>
+              <a:t> </a:t>
+            </a:r>
+            <a:r>
+              <a:rPr lang="nl-NL" dirty="0" err="1" smtClean="0"/>
+              <a:t>with</a:t>
+            </a:r>
+            <a:r>
+              <a:rPr lang="nl-NL" dirty="0" smtClean="0"/>
+              <a:t> </a:t>
+            </a:r>
+            <a:r>
+              <a:rPr lang="nl-NL" dirty="0" err="1" smtClean="0"/>
+              <a:t>hours</a:t>
+            </a:r>
+            <a:r>
+              <a:rPr lang="nl-NL" dirty="0" smtClean="0"/>
+              <a:t> </a:t>
+            </a:r>
+            <a:r>
+              <a:rPr lang="nl-NL" dirty="0" err="1" smtClean="0"/>
+              <a:t>and</a:t>
+            </a:r>
+            <a:r>
+              <a:rPr lang="nl-NL" dirty="0" smtClean="0"/>
+              <a:t> minutes</a:t>
+            </a:r>
+          </a:p>
+          <a:p>
+            <a:pPr marL="742950" lvl="1" indent="-285750">
+              <a:buFont typeface="Arial" panose="020B0604020202020204" pitchFamily="34" charset="0"/>
+              <a:buChar char="•"/>
+            </a:pPr>
+            <a:endParaRPr lang="nl-NL" dirty="0"/>
+          </a:p>
+          <a:p>
+            <a:pPr marL="285750" indent="-285750">
+              <a:buFont typeface="Arial" panose="020B0604020202020204" pitchFamily="34" charset="0"/>
+              <a:buChar char="•"/>
+            </a:pPr>
+            <a:r>
+              <a:rPr lang="nl-NL" sz="2800" dirty="0" smtClean="0"/>
+              <a:t>Turning the alarm on/off</a:t>
+            </a:r>
+          </a:p>
+          <a:p>
+            <a:pPr marL="742950" lvl="1" indent="-285750">
+              <a:buFont typeface="Arial" panose="020B0604020202020204" pitchFamily="34" charset="0"/>
+              <a:buChar char="•"/>
+            </a:pPr>
+            <a:r>
+              <a:rPr lang="nl-NL" dirty="0" err="1" smtClean="0"/>
+              <a:t>While</a:t>
+            </a:r>
+            <a:r>
+              <a:rPr lang="nl-NL" dirty="0" smtClean="0"/>
+              <a:t> </a:t>
+            </a:r>
+            <a:r>
+              <a:rPr lang="nl-NL" dirty="0" err="1" smtClean="0"/>
+              <a:t>changing</a:t>
+            </a:r>
+            <a:r>
+              <a:rPr lang="nl-NL" dirty="0" smtClean="0"/>
+              <a:t> the time </a:t>
+            </a:r>
+            <a:r>
+              <a:rPr lang="nl-NL" dirty="0" err="1" smtClean="0"/>
+              <a:t>press</a:t>
+            </a:r>
+            <a:r>
+              <a:rPr lang="nl-NL" dirty="0" smtClean="0"/>
+              <a:t> SW0 </a:t>
+            </a:r>
+            <a:r>
+              <a:rPr lang="nl-NL" dirty="0" err="1" smtClean="0"/>
+              <a:t>to</a:t>
+            </a:r>
+            <a:r>
+              <a:rPr lang="nl-NL" dirty="0" smtClean="0"/>
+              <a:t> </a:t>
+            </a:r>
+            <a:r>
+              <a:rPr lang="nl-NL" dirty="0" err="1" smtClean="0"/>
+              <a:t>toggle</a:t>
+            </a:r>
+            <a:r>
+              <a:rPr lang="nl-NL" dirty="0" smtClean="0"/>
+              <a:t> the alarm status</a:t>
+            </a:r>
+          </a:p>
+          <a:p>
+            <a:pPr marL="742950" lvl="1" indent="-285750">
+              <a:buFont typeface="Arial" panose="020B0604020202020204" pitchFamily="34" charset="0"/>
+              <a:buChar char="•"/>
+            </a:pPr>
+            <a:endParaRPr lang="nl-NL" dirty="0" smtClean="0"/>
+          </a:p>
+          <a:p>
+            <a:pPr marL="285750" indent="-285750">
+              <a:buFont typeface="Arial" panose="020B0604020202020204" pitchFamily="34" charset="0"/>
+              <a:buChar char="•"/>
+            </a:pPr>
+            <a:r>
+              <a:rPr lang="nl-NL" sz="2800" dirty="0" err="1" smtClean="0"/>
+              <a:t>Snooze</a:t>
+            </a:r>
+            <a:endParaRPr lang="nl-NL" sz="2800" dirty="0"/>
+          </a:p>
+          <a:p>
+            <a:pPr marL="742950" lvl="1" indent="-285750">
+              <a:buFont typeface="Arial" panose="020B0604020202020204" pitchFamily="34" charset="0"/>
+              <a:buChar char="•"/>
+            </a:pPr>
+            <a:r>
+              <a:rPr lang="nl-NL" dirty="0" err="1" smtClean="0"/>
+              <a:t>When</a:t>
+            </a:r>
+            <a:r>
+              <a:rPr lang="nl-NL" dirty="0" smtClean="0"/>
+              <a:t> the alarm is </a:t>
+            </a:r>
+            <a:r>
+              <a:rPr lang="nl-NL" dirty="0" err="1" smtClean="0"/>
+              <a:t>going</a:t>
+            </a:r>
+            <a:r>
+              <a:rPr lang="nl-NL" dirty="0" smtClean="0"/>
+              <a:t> off </a:t>
+            </a:r>
+            <a:r>
+              <a:rPr lang="nl-NL" dirty="0" err="1" smtClean="0"/>
+              <a:t>press</a:t>
+            </a:r>
+            <a:r>
+              <a:rPr lang="nl-NL" dirty="0" smtClean="0"/>
+              <a:t> SW1 </a:t>
+            </a:r>
+            <a:r>
+              <a:rPr lang="nl-NL" dirty="0" err="1" smtClean="0"/>
+              <a:t>to</a:t>
+            </a:r>
+            <a:r>
+              <a:rPr lang="nl-NL" dirty="0" smtClean="0"/>
+              <a:t> </a:t>
+            </a:r>
+            <a:r>
+              <a:rPr lang="nl-NL" dirty="0" err="1" smtClean="0"/>
+              <a:t>snooze</a:t>
+            </a:r>
+            <a:r>
+              <a:rPr lang="nl-NL" dirty="0" smtClean="0"/>
+              <a:t> or SW0 </a:t>
+            </a:r>
+            <a:r>
+              <a:rPr lang="nl-NL" dirty="0" err="1" smtClean="0"/>
+              <a:t>to</a:t>
+            </a:r>
+            <a:r>
+              <a:rPr lang="nl-NL" dirty="0" smtClean="0"/>
+              <a:t> turn </a:t>
+            </a:r>
+            <a:r>
+              <a:rPr lang="nl-NL" dirty="0" err="1" smtClean="0"/>
+              <a:t>it</a:t>
+            </a:r>
+            <a:r>
+              <a:rPr lang="nl-NL" dirty="0" smtClean="0"/>
+              <a:t> off </a:t>
+            </a:r>
           </a:p>
         </p:txBody>
       </p:sp>
@@ -6536,7 +6878,7 @@
           <a:p>
             <a:fld id="{D3508A91-0AA4-4448-BAC6-5C0A4820891B}" type="datetime1">
               <a:rPr lang="nl-NL" smtClean="0"/>
-              <a:t>13-4-2015</a:t>
+              <a:t>15-4-2015</a:t>
             </a:fld>
             <a:endParaRPr lang="nl-NL"/>
           </a:p>
@@ -6726,7 +7068,7 @@
           <a:p>
             <a:fld id="{5782F50F-33B8-4739-B56D-053B6761C188}" type="datetime1">
               <a:rPr lang="nl-NL" smtClean="0"/>
-              <a:t>13-4-2015</a:t>
+              <a:t>15-4-2015</a:t>
             </a:fld>
             <a:endParaRPr lang="nl-NL" dirty="0"/>
           </a:p>

</xml_diff>